<commit_message>
Adding Blockchain Star Registry
</commit_message>
<xml_diff>
--- a/images/ppt-to-size-images.pptx
+++ b/images/ppt-to-size-images.pptx
@@ -20,7 +20,8 @@
     <p:sldId id="259" r:id="rId14"/>
     <p:sldId id="270" r:id="rId15"/>
     <p:sldId id="271" r:id="rId16"/>
-    <p:sldId id="268" r:id="rId17"/>
+    <p:sldId id="272" r:id="rId17"/>
+    <p:sldId id="268" r:id="rId18"/>
   </p:sldIdLst>
   <p:sldSz cx="12192000" cy="6858000"/>
   <p:notesSz cx="6858000" cy="9144000"/>
@@ -258,7 +259,7 @@
           <a:p>
             <a:fld id="{12B6DBB2-C918-40F8-AB3C-69C5EB3B8A38}" type="datetimeFigureOut">
               <a:rPr lang="en-US" smtClean="0"/>
-              <a:t>10/11/2018</a:t>
+              <a:t>10/26/2018</a:t>
             </a:fld>
             <a:endParaRPr lang="en-US"/>
           </a:p>
@@ -428,7 +429,7 @@
           <a:p>
             <a:fld id="{12B6DBB2-C918-40F8-AB3C-69C5EB3B8A38}" type="datetimeFigureOut">
               <a:rPr lang="en-US" smtClean="0"/>
-              <a:t>10/11/2018</a:t>
+              <a:t>10/26/2018</a:t>
             </a:fld>
             <a:endParaRPr lang="en-US"/>
           </a:p>
@@ -608,7 +609,7 @@
           <a:p>
             <a:fld id="{12B6DBB2-C918-40F8-AB3C-69C5EB3B8A38}" type="datetimeFigureOut">
               <a:rPr lang="en-US" smtClean="0"/>
-              <a:t>10/11/2018</a:t>
+              <a:t>10/26/2018</a:t>
             </a:fld>
             <a:endParaRPr lang="en-US"/>
           </a:p>
@@ -778,7 +779,7 @@
           <a:p>
             <a:fld id="{12B6DBB2-C918-40F8-AB3C-69C5EB3B8A38}" type="datetimeFigureOut">
               <a:rPr lang="en-US" smtClean="0"/>
-              <a:t>10/11/2018</a:t>
+              <a:t>10/26/2018</a:t>
             </a:fld>
             <a:endParaRPr lang="en-US"/>
           </a:p>
@@ -1024,7 +1025,7 @@
           <a:p>
             <a:fld id="{12B6DBB2-C918-40F8-AB3C-69C5EB3B8A38}" type="datetimeFigureOut">
               <a:rPr lang="en-US" smtClean="0"/>
-              <a:t>10/11/2018</a:t>
+              <a:t>10/26/2018</a:t>
             </a:fld>
             <a:endParaRPr lang="en-US"/>
           </a:p>
@@ -1256,7 +1257,7 @@
           <a:p>
             <a:fld id="{12B6DBB2-C918-40F8-AB3C-69C5EB3B8A38}" type="datetimeFigureOut">
               <a:rPr lang="en-US" smtClean="0"/>
-              <a:t>10/11/2018</a:t>
+              <a:t>10/26/2018</a:t>
             </a:fld>
             <a:endParaRPr lang="en-US"/>
           </a:p>
@@ -1623,7 +1624,7 @@
           <a:p>
             <a:fld id="{12B6DBB2-C918-40F8-AB3C-69C5EB3B8A38}" type="datetimeFigureOut">
               <a:rPr lang="en-US" smtClean="0"/>
-              <a:t>10/11/2018</a:t>
+              <a:t>10/26/2018</a:t>
             </a:fld>
             <a:endParaRPr lang="en-US"/>
           </a:p>
@@ -1741,7 +1742,7 @@
           <a:p>
             <a:fld id="{12B6DBB2-C918-40F8-AB3C-69C5EB3B8A38}" type="datetimeFigureOut">
               <a:rPr lang="en-US" smtClean="0"/>
-              <a:t>10/11/2018</a:t>
+              <a:t>10/26/2018</a:t>
             </a:fld>
             <a:endParaRPr lang="en-US"/>
           </a:p>
@@ -1836,7 +1837,7 @@
           <a:p>
             <a:fld id="{12B6DBB2-C918-40F8-AB3C-69C5EB3B8A38}" type="datetimeFigureOut">
               <a:rPr lang="en-US" smtClean="0"/>
-              <a:t>10/11/2018</a:t>
+              <a:t>10/26/2018</a:t>
             </a:fld>
             <a:endParaRPr lang="en-US"/>
           </a:p>
@@ -2113,7 +2114,7 @@
           <a:p>
             <a:fld id="{12B6DBB2-C918-40F8-AB3C-69C5EB3B8A38}" type="datetimeFigureOut">
               <a:rPr lang="en-US" smtClean="0"/>
-              <a:t>10/11/2018</a:t>
+              <a:t>10/26/2018</a:t>
             </a:fld>
             <a:endParaRPr lang="en-US"/>
           </a:p>
@@ -2366,7 +2367,7 @@
           <a:p>
             <a:fld id="{12B6DBB2-C918-40F8-AB3C-69C5EB3B8A38}" type="datetimeFigureOut">
               <a:rPr lang="en-US" smtClean="0"/>
-              <a:t>10/11/2018</a:t>
+              <a:t>10/26/2018</a:t>
             </a:fld>
             <a:endParaRPr lang="en-US"/>
           </a:p>
@@ -2579,7 +2580,7 @@
           <a:p>
             <a:fld id="{12B6DBB2-C918-40F8-AB3C-69C5EB3B8A38}" type="datetimeFigureOut">
               <a:rPr lang="en-US" smtClean="0"/>
-              <a:t>10/11/2018</a:t>
+              <a:t>10/26/2018</a:t>
             </a:fld>
             <a:endParaRPr lang="en-US"/>
           </a:p>
@@ -4004,6 +4005,118 @@
           <a:chExt cx="0" cy="0"/>
         </a:xfrm>
       </p:grpSpPr>
+      <p:grpSp>
+        <p:nvGrpSpPr>
+          <p:cNvPr id="5" name="Group 4"/>
+          <p:cNvGrpSpPr/>
+          <p:nvPr/>
+        </p:nvGrpSpPr>
+        <p:grpSpPr>
+          <a:xfrm>
+            <a:off x="1142355" y="2482015"/>
+            <a:ext cx="4455459" cy="3621742"/>
+            <a:chOff x="1142355" y="2482015"/>
+            <a:chExt cx="4455459" cy="3621742"/>
+          </a:xfrm>
+        </p:grpSpPr>
+        <p:sp>
+          <p:nvSpPr>
+            <p:cNvPr id="10" name="Rounded Rectangle 9"/>
+            <p:cNvSpPr/>
+            <p:nvPr/>
+          </p:nvSpPr>
+          <p:spPr>
+            <a:xfrm>
+              <a:off x="1142355" y="2482015"/>
+              <a:ext cx="4455459" cy="3621742"/>
+            </a:xfrm>
+            <a:prstGeom prst="roundRect">
+              <a:avLst/>
+            </a:prstGeom>
+            <a:solidFill>
+              <a:schemeClr val="bg1"/>
+            </a:solidFill>
+          </p:spPr>
+          <p:style>
+            <a:lnRef idx="2">
+              <a:schemeClr val="accent1">
+                <a:shade val="50000"/>
+              </a:schemeClr>
+            </a:lnRef>
+            <a:fillRef idx="1">
+              <a:schemeClr val="accent1"/>
+            </a:fillRef>
+            <a:effectRef idx="0">
+              <a:schemeClr val="accent1"/>
+            </a:effectRef>
+            <a:fontRef idx="minor">
+              <a:schemeClr val="lt1"/>
+            </a:fontRef>
+          </p:style>
+          <p:txBody>
+            <a:bodyPr rtlCol="0" anchor="ctr"/>
+            <a:lstStyle/>
+            <a:p>
+              <a:pPr algn="ctr"/>
+              <a:endParaRPr lang="en-US"/>
+            </a:p>
+          </p:txBody>
+        </p:sp>
+        <p:pic>
+          <p:nvPicPr>
+            <p:cNvPr id="4" name="Picture 3"/>
+            <p:cNvPicPr>
+              <a:picLocks noChangeAspect="1"/>
+            </p:cNvPicPr>
+            <p:nvPr/>
+          </p:nvPicPr>
+          <p:blipFill>
+            <a:blip r:embed="rId2"/>
+            <a:stretch>
+              <a:fillRect/>
+            </a:stretch>
+          </p:blipFill>
+          <p:spPr>
+            <a:xfrm>
+              <a:off x="1142355" y="3143714"/>
+              <a:ext cx="4455459" cy="2298344"/>
+            </a:xfrm>
+            <a:prstGeom prst="rect">
+              <a:avLst/>
+            </a:prstGeom>
+          </p:spPr>
+        </p:pic>
+      </p:grpSp>
+    </p:spTree>
+    <p:extLst>
+      <p:ext uri="{BB962C8B-B14F-4D97-AF65-F5344CB8AC3E}">
+        <p14:creationId xmlns:p14="http://schemas.microsoft.com/office/powerpoint/2010/main" val="4125126865"/>
+      </p:ext>
+    </p:extLst>
+  </p:cSld>
+  <p:clrMapOvr>
+    <a:masterClrMapping/>
+  </p:clrMapOvr>
+</p:sld>
+</file>
+
+<file path=ppt/slides/slide17.xml><?xml version="1.0" encoding="utf-8"?>
+<p:sld xmlns:a="http://schemas.openxmlformats.org/drawingml/2006/main" xmlns:r="http://schemas.openxmlformats.org/officeDocument/2006/relationships" xmlns:p="http://schemas.openxmlformats.org/presentationml/2006/main">
+  <p:cSld>
+    <p:spTree>
+      <p:nvGrpSpPr>
+        <p:cNvPr id="1" name=""/>
+        <p:cNvGrpSpPr/>
+        <p:nvPr/>
+      </p:nvGrpSpPr>
+      <p:grpSpPr>
+        <a:xfrm>
+          <a:off x="0" y="0"/>
+          <a:ext cx="0" cy="0"/>
+          <a:chOff x="0" y="0"/>
+          <a:chExt cx="0" cy="0"/>
+        </a:xfrm>
+      </p:grpSpPr>
       <p:pic>
         <p:nvPicPr>
           <p:cNvPr id="2" name="Picture 1"/>

</xml_diff>